<commit_message>
Update pptx and graphs
</commit_message>
<xml_diff>
--- a/AnalysisofUSPowerPlantOutages_Capstone_2018-09-05.pptx
+++ b/AnalysisofUSPowerPlantOutages_Capstone_2018-09-05.pptx
@@ -108,6 +108,11 @@
       </a:defRPr>
     </a:lvl9pPr>
   </p:defaultTextStyle>
+  <p:extLst>
+    <p:ext uri="{EFAFB233-063F-42B5-8137-9DF3F51BA10A}">
+      <p15:sldGuideLst xmlns:p15="http://schemas.microsoft.com/office/powerpoint/2012/main"/>
+    </p:ext>
+  </p:extLst>
 </p:presentation>
 </file>
 
@@ -242,7 +247,7 @@
           <a:p>
             <a:fld id="{938CE102-11F0-421A-A304-803FAC9F6CE4}" type="datetimeFigureOut">
               <a:rPr lang="en-US" smtClean="0"/>
-              <a:t>09/05/2018</a:t>
+              <a:t>9/6/2018</a:t>
             </a:fld>
             <a:endParaRPr lang="en-US"/>
           </a:p>
@@ -412,7 +417,7 @@
           <a:p>
             <a:fld id="{938CE102-11F0-421A-A304-803FAC9F6CE4}" type="datetimeFigureOut">
               <a:rPr lang="en-US" smtClean="0"/>
-              <a:t>09/05/2018</a:t>
+              <a:t>9/6/2018</a:t>
             </a:fld>
             <a:endParaRPr lang="en-US"/>
           </a:p>
@@ -592,7 +597,7 @@
           <a:p>
             <a:fld id="{938CE102-11F0-421A-A304-803FAC9F6CE4}" type="datetimeFigureOut">
               <a:rPr lang="en-US" smtClean="0"/>
-              <a:t>09/05/2018</a:t>
+              <a:t>9/6/2018</a:t>
             </a:fld>
             <a:endParaRPr lang="en-US"/>
           </a:p>
@@ -762,7 +767,7 @@
           <a:p>
             <a:fld id="{938CE102-11F0-421A-A304-803FAC9F6CE4}" type="datetimeFigureOut">
               <a:rPr lang="en-US" smtClean="0"/>
-              <a:t>09/05/2018</a:t>
+              <a:t>9/6/2018</a:t>
             </a:fld>
             <a:endParaRPr lang="en-US"/>
           </a:p>
@@ -1008,7 +1013,7 @@
           <a:p>
             <a:fld id="{938CE102-11F0-421A-A304-803FAC9F6CE4}" type="datetimeFigureOut">
               <a:rPr lang="en-US" smtClean="0"/>
-              <a:t>09/05/2018</a:t>
+              <a:t>9/6/2018</a:t>
             </a:fld>
             <a:endParaRPr lang="en-US"/>
           </a:p>
@@ -1240,7 +1245,7 @@
           <a:p>
             <a:fld id="{938CE102-11F0-421A-A304-803FAC9F6CE4}" type="datetimeFigureOut">
               <a:rPr lang="en-US" smtClean="0"/>
-              <a:t>09/05/2018</a:t>
+              <a:t>9/6/2018</a:t>
             </a:fld>
             <a:endParaRPr lang="en-US"/>
           </a:p>
@@ -1607,7 +1612,7 @@
           <a:p>
             <a:fld id="{938CE102-11F0-421A-A304-803FAC9F6CE4}" type="datetimeFigureOut">
               <a:rPr lang="en-US" smtClean="0"/>
-              <a:t>09/05/2018</a:t>
+              <a:t>9/6/2018</a:t>
             </a:fld>
             <a:endParaRPr lang="en-US"/>
           </a:p>
@@ -1725,7 +1730,7 @@
           <a:p>
             <a:fld id="{938CE102-11F0-421A-A304-803FAC9F6CE4}" type="datetimeFigureOut">
               <a:rPr lang="en-US" smtClean="0"/>
-              <a:t>09/05/2018</a:t>
+              <a:t>9/6/2018</a:t>
             </a:fld>
             <a:endParaRPr lang="en-US"/>
           </a:p>
@@ -1820,7 +1825,7 @@
           <a:p>
             <a:fld id="{938CE102-11F0-421A-A304-803FAC9F6CE4}" type="datetimeFigureOut">
               <a:rPr lang="en-US" smtClean="0"/>
-              <a:t>09/05/2018</a:t>
+              <a:t>9/6/2018</a:t>
             </a:fld>
             <a:endParaRPr lang="en-US"/>
           </a:p>
@@ -2097,7 +2102,7 @@
           <a:p>
             <a:fld id="{938CE102-11F0-421A-A304-803FAC9F6CE4}" type="datetimeFigureOut">
               <a:rPr lang="en-US" smtClean="0"/>
-              <a:t>09/05/2018</a:t>
+              <a:t>9/6/2018</a:t>
             </a:fld>
             <a:endParaRPr lang="en-US"/>
           </a:p>
@@ -2350,7 +2355,7 @@
           <a:p>
             <a:fld id="{938CE102-11F0-421A-A304-803FAC9F6CE4}" type="datetimeFigureOut">
               <a:rPr lang="en-US" smtClean="0"/>
-              <a:t>09/05/2018</a:t>
+              <a:t>9/6/2018</a:t>
             </a:fld>
             <a:endParaRPr lang="en-US"/>
           </a:p>
@@ -2563,7 +2568,7 @@
           <a:p>
             <a:fld id="{938CE102-11F0-421A-A304-803FAC9F6CE4}" type="datetimeFigureOut">
               <a:rPr lang="en-US" smtClean="0"/>
-              <a:t>09/05/2018</a:t>
+              <a:t>9/6/2018</a:t>
             </a:fld>
             <a:endParaRPr lang="en-US"/>
           </a:p>
@@ -2997,7 +3002,25 @@
                 </a:solidFill>
                 <a:latin typeface="+mn-lt"/>
               </a:rPr>
-              <a:t>Analysis of US Power Plant Outages from an Equipment Breakdown Insurance Perspective</a:t>
+              <a:t>Analysis of US Power Plant Outages from an Equipment </a:t>
+            </a:r>
+            <a:r>
+              <a:rPr lang="en-US" sz="4000" dirty="0" smtClean="0">
+                <a:solidFill>
+                  <a:srgbClr val="002060"/>
+                </a:solidFill>
+                <a:latin typeface="+mn-lt"/>
+              </a:rPr>
+              <a:t>Breakdown </a:t>
+            </a:r>
+            <a:r>
+              <a:rPr lang="en-US" sz="4000" dirty="0" smtClean="0">
+                <a:solidFill>
+                  <a:srgbClr val="002060"/>
+                </a:solidFill>
+                <a:latin typeface="+mn-lt"/>
+              </a:rPr>
+              <a:t>Insurance Perspective</a:t>
             </a:r>
             <a:endParaRPr lang="en-US" sz="4000" dirty="0">
               <a:solidFill>

</xml_diff>